<commit_message>
Hereis the power point from the meeting
</commit_message>
<xml_diff>
--- a/Preiliminary Report/PrelimReport.pptx
+++ b/Preiliminary Report/PrelimReport.pptx
@@ -300,7 +300,7 @@
           <a:p>
             <a:fld id="{A48D7F77-2339-244C-8423-ABFC9DEF005D}" type="datetimeFigureOut">
               <a:rPr lang="en-US" smtClean="0"/>
-              <a:t>10/7/14</a:t>
+              <a:t>10/5/14</a:t>
             </a:fld>
             <a:endParaRPr lang="en-US"/>
           </a:p>
@@ -470,7 +470,7 @@
           <a:p>
             <a:fld id="{A48D7F77-2339-244C-8423-ABFC9DEF005D}" type="datetimeFigureOut">
               <a:rPr lang="en-US" smtClean="0"/>
-              <a:t>10/7/14</a:t>
+              <a:t>10/5/14</a:t>
             </a:fld>
             <a:endParaRPr lang="en-US"/>
           </a:p>
@@ -650,7 +650,7 @@
           <a:p>
             <a:fld id="{A48D7F77-2339-244C-8423-ABFC9DEF005D}" type="datetimeFigureOut">
               <a:rPr lang="en-US" smtClean="0"/>
-              <a:t>10/7/14</a:t>
+              <a:t>10/5/14</a:t>
             </a:fld>
             <a:endParaRPr lang="en-US"/>
           </a:p>
@@ -820,7 +820,7 @@
           <a:p>
             <a:fld id="{A48D7F77-2339-244C-8423-ABFC9DEF005D}" type="datetimeFigureOut">
               <a:rPr lang="en-US" smtClean="0"/>
-              <a:t>10/7/14</a:t>
+              <a:t>10/5/14</a:t>
             </a:fld>
             <a:endParaRPr lang="en-US"/>
           </a:p>
@@ -1066,7 +1066,7 @@
           <a:p>
             <a:fld id="{A48D7F77-2339-244C-8423-ABFC9DEF005D}" type="datetimeFigureOut">
               <a:rPr lang="en-US" smtClean="0"/>
-              <a:t>10/7/14</a:t>
+              <a:t>10/5/14</a:t>
             </a:fld>
             <a:endParaRPr lang="en-US"/>
           </a:p>
@@ -1354,7 +1354,7 @@
           <a:p>
             <a:fld id="{A48D7F77-2339-244C-8423-ABFC9DEF005D}" type="datetimeFigureOut">
               <a:rPr lang="en-US" smtClean="0"/>
-              <a:t>10/7/14</a:t>
+              <a:t>10/5/14</a:t>
             </a:fld>
             <a:endParaRPr lang="en-US"/>
           </a:p>
@@ -1776,7 +1776,7 @@
           <a:p>
             <a:fld id="{A48D7F77-2339-244C-8423-ABFC9DEF005D}" type="datetimeFigureOut">
               <a:rPr lang="en-US" smtClean="0"/>
-              <a:t>10/7/14</a:t>
+              <a:t>10/5/14</a:t>
             </a:fld>
             <a:endParaRPr lang="en-US"/>
           </a:p>
@@ -1894,7 +1894,7 @@
           <a:p>
             <a:fld id="{A48D7F77-2339-244C-8423-ABFC9DEF005D}" type="datetimeFigureOut">
               <a:rPr lang="en-US" smtClean="0"/>
-              <a:t>10/7/14</a:t>
+              <a:t>10/5/14</a:t>
             </a:fld>
             <a:endParaRPr lang="en-US"/>
           </a:p>
@@ -1989,7 +1989,7 @@
           <a:p>
             <a:fld id="{A48D7F77-2339-244C-8423-ABFC9DEF005D}" type="datetimeFigureOut">
               <a:rPr lang="en-US" smtClean="0"/>
-              <a:t>10/7/14</a:t>
+              <a:t>10/5/14</a:t>
             </a:fld>
             <a:endParaRPr lang="en-US"/>
           </a:p>
@@ -2266,7 +2266,7 @@
           <a:p>
             <a:fld id="{A48D7F77-2339-244C-8423-ABFC9DEF005D}" type="datetimeFigureOut">
               <a:rPr lang="en-US" smtClean="0"/>
-              <a:t>10/7/14</a:t>
+              <a:t>10/5/14</a:t>
             </a:fld>
             <a:endParaRPr lang="en-US"/>
           </a:p>
@@ -2519,7 +2519,7 @@
           <a:p>
             <a:fld id="{A48D7F77-2339-244C-8423-ABFC9DEF005D}" type="datetimeFigureOut">
               <a:rPr lang="en-US" smtClean="0"/>
-              <a:t>10/7/14</a:t>
+              <a:t>10/5/14</a:t>
             </a:fld>
             <a:endParaRPr lang="en-US"/>
           </a:p>
@@ -2732,7 +2732,7 @@
           <a:p>
             <a:fld id="{A48D7F77-2339-244C-8423-ABFC9DEF005D}" type="datetimeFigureOut">
               <a:rPr lang="en-US" smtClean="0"/>
-              <a:t>10/7/14</a:t>
+              <a:t>10/5/14</a:t>
             </a:fld>
             <a:endParaRPr lang="en-US"/>
           </a:p>
@@ -3126,11 +3126,7 @@
           <a:p>
             <a:r>
               <a:rPr lang="en-US" dirty="0" smtClean="0"/>
-              <a:t>Acoustic Health Monitoring and failure localization of Suspension Bridge </a:t>
-            </a:r>
-            <a:r>
-              <a:rPr lang="en-US" dirty="0" smtClean="0"/>
-              <a:t>Main Cables</a:t>
+              <a:t>Acoustic Health Monitoring and failure localization of Suspension Bridge Cables</a:t>
             </a:r>
             <a:endParaRPr lang="en-US" dirty="0"/>
           </a:p>
@@ -3177,13 +3173,6 @@
   <p:clrMapOvr>
     <a:masterClrMapping/>
   </p:clrMapOvr>
-  <p:timing>
-    <p:tnLst>
-      <p:par>
-        <p:cTn xmlns:p14="http://schemas.microsoft.com/office/powerpoint/2010/main" id="1" dur="indefinite" restart="never" nodeType="tmRoot"/>
-      </p:par>
-    </p:tnLst>
-  </p:timing>
 </p:sld>
 </file>
 
@@ -3368,13 +3357,6 @@
   <p:clrMapOvr>
     <a:masterClrMapping/>
   </p:clrMapOvr>
-  <p:timing>
-    <p:tnLst>
-      <p:par>
-        <p:cTn xmlns:p14="http://schemas.microsoft.com/office/powerpoint/2010/main" id="1" dur="indefinite" restart="never" nodeType="tmRoot"/>
-      </p:par>
-    </p:tnLst>
-  </p:timing>
 </p:sld>
 </file>
 
@@ -3474,13 +3456,6 @@
   <p:clrMapOvr>
     <a:masterClrMapping/>
   </p:clrMapOvr>
-  <p:timing>
-    <p:tnLst>
-      <p:par>
-        <p:cTn xmlns:p14="http://schemas.microsoft.com/office/powerpoint/2010/main" id="1" dur="indefinite" restart="never" nodeType="tmRoot"/>
-      </p:par>
-    </p:tnLst>
-  </p:timing>
 </p:sld>
 </file>
 
@@ -3579,13 +3554,6 @@
   <p:clrMapOvr>
     <a:masterClrMapping/>
   </p:clrMapOvr>
-  <p:timing>
-    <p:tnLst>
-      <p:par>
-        <p:cTn xmlns:p14="http://schemas.microsoft.com/office/powerpoint/2010/main" id="1" dur="indefinite" restart="never" nodeType="tmRoot"/>
-      </p:par>
-    </p:tnLst>
-  </p:timing>
 </p:sld>
 </file>
 
@@ -3648,7 +3616,15 @@
           <a:p>
             <a:r>
               <a:rPr lang="en-US" dirty="0" smtClean="0"/>
-              <a:t>Using the Claiborne Pell Bridge as a testing platform, it is possible to improve upon the existing methods for acoustic monitoring of suspension cables. It is possible to extend upon previous methods in order to pinpoint and determine the precise location and cable member which is damaged. This method will allow for the repair and monitoring of cable members without intrusive and damaging guess and check inspections. </a:t>
+              <a:t>Using the </a:t>
+            </a:r>
+            <a:r>
+              <a:rPr lang="en-US" dirty="0" err="1" smtClean="0"/>
+              <a:t>Claireborn</a:t>
+            </a:r>
+            <a:r>
+              <a:rPr lang="en-US" dirty="0" smtClean="0"/>
+              <a:t> Pell Bridge as a testing platform, it is possible to improve upon the existing methods for acoustic monitoring of suspension cables. It is possible to extend upon previous methods in order to pinpoint and determine the precise location and cable member which is damaged. This method will allow for the repair and monitoring of cable members without intrusive and damaging guess and check inspections. </a:t>
             </a:r>
             <a:endParaRPr lang="en-US" dirty="0"/>
           </a:p>
@@ -3664,13 +3640,6 @@
   <p:clrMapOvr>
     <a:masterClrMapping/>
   </p:clrMapOvr>
-  <p:timing>
-    <p:tnLst>
-      <p:par>
-        <p:cTn xmlns:p14="http://schemas.microsoft.com/office/powerpoint/2010/main" id="1" dur="indefinite" restart="never" nodeType="tmRoot"/>
-      </p:par>
-    </p:tnLst>
-  </p:timing>
 </p:sld>
 </file>
 
@@ -3773,13 +3742,6 @@
   <p:clrMapOvr>
     <a:masterClrMapping/>
   </p:clrMapOvr>
-  <p:timing>
-    <p:tnLst>
-      <p:par>
-        <p:cTn xmlns:p14="http://schemas.microsoft.com/office/powerpoint/2010/main" id="1" dur="indefinite" restart="never" nodeType="tmRoot"/>
-      </p:par>
-    </p:tnLst>
-  </p:timing>
 </p:sld>
 </file>
 
@@ -3862,13 +3824,6 @@
   <p:clrMapOvr>
     <a:masterClrMapping/>
   </p:clrMapOvr>
-  <p:timing>
-    <p:tnLst>
-      <p:par>
-        <p:cTn xmlns:p14="http://schemas.microsoft.com/office/powerpoint/2010/main" id="1" dur="indefinite" restart="never" nodeType="tmRoot"/>
-      </p:par>
-    </p:tnLst>
-  </p:timing>
 </p:sld>
 </file>
 
@@ -3964,13 +3919,6 @@
   <p:clrMapOvr>
     <a:masterClrMapping/>
   </p:clrMapOvr>
-  <p:timing>
-    <p:tnLst>
-      <p:par>
-        <p:cTn xmlns:p14="http://schemas.microsoft.com/office/powerpoint/2010/main" id="1" dur="indefinite" restart="never" nodeType="tmRoot"/>
-      </p:par>
-    </p:tnLst>
-  </p:timing>
 </p:sld>
 </file>
 
@@ -4060,13 +4008,6 @@
   <p:clrMapOvr>
     <a:masterClrMapping/>
   </p:clrMapOvr>
-  <p:timing>
-    <p:tnLst>
-      <p:par>
-        <p:cTn xmlns:p14="http://schemas.microsoft.com/office/powerpoint/2010/main" id="1" dur="indefinite" restart="never" nodeType="tmRoot"/>
-      </p:par>
-    </p:tnLst>
-  </p:timing>
 </p:sld>
 </file>
 
@@ -4157,13 +4098,6 @@
   <p:clrMapOvr>
     <a:masterClrMapping/>
   </p:clrMapOvr>
-  <p:timing>
-    <p:tnLst>
-      <p:par>
-        <p:cTn xmlns:p14="http://schemas.microsoft.com/office/powerpoint/2010/main" id="1" dur="indefinite" restart="never" nodeType="tmRoot"/>
-      </p:par>
-    </p:tnLst>
-  </p:timing>
 </p:sld>
 </file>
 
@@ -4247,13 +4181,6 @@
   <p:clrMapOvr>
     <a:masterClrMapping/>
   </p:clrMapOvr>
-  <p:timing>
-    <p:tnLst>
-      <p:par>
-        <p:cTn xmlns:p14="http://schemas.microsoft.com/office/powerpoint/2010/main" id="1" dur="indefinite" restart="never" nodeType="tmRoot"/>
-      </p:par>
-    </p:tnLst>
-  </p:timing>
 </p:sld>
 </file>
 

</xml_diff>